<commit_message>
Update presentation content for review 2
</commit_message>
<xml_diff>
--- a/docs/Neural Review 2.pptx
+++ b/docs/Neural Review 2.pptx
@@ -108,6 +108,11 @@
       </a:defRPr>
     </a:lvl9pPr>
   </p:defaultTextStyle>
+  <p:extLst>
+    <p:ext uri="{EFAFB233-063F-42B5-8137-9DF3F51BA10A}">
+      <p15:sldGuideLst xmlns:p15="http://schemas.microsoft.com/office/powerpoint/2012/main"/>
+    </p:ext>
+  </p:extLst>
 </p:presentation>
 </file>
 
@@ -337,7 +342,7 @@
           <a:p>
             <a:fld id="{543FFB24-F10E-4FC0-B071-004DD38FB1BB}" type="datetimeFigureOut">
               <a:rPr lang="en-US" smtClean="0"/>
-              <a:t>19-Oct-16</a:t>
+              <a:t>11/7/2016</a:t>
             </a:fld>
             <a:endParaRPr lang="en-US"/>
           </a:p>
@@ -545,7 +550,7 @@
           <a:p>
             <a:fld id="{543FFB24-F10E-4FC0-B071-004DD38FB1BB}" type="datetimeFigureOut">
               <a:rPr lang="en-US" smtClean="0"/>
-              <a:t>19-Oct-16</a:t>
+              <a:t>11/7/2016</a:t>
             </a:fld>
             <a:endParaRPr lang="en-US"/>
           </a:p>
@@ -801,7 +806,7 @@
           <a:p>
             <a:fld id="{543FFB24-F10E-4FC0-B071-004DD38FB1BB}" type="datetimeFigureOut">
               <a:rPr lang="en-US" smtClean="0"/>
-              <a:t>19-Oct-16</a:t>
+              <a:t>11/7/2016</a:t>
             </a:fld>
             <a:endParaRPr lang="en-US"/>
           </a:p>
@@ -975,7 +980,7 @@
           <a:p>
             <a:fld id="{543FFB24-F10E-4FC0-B071-004DD38FB1BB}" type="datetimeFigureOut">
               <a:rPr lang="en-US" smtClean="0"/>
-              <a:t>19-Oct-16</a:t>
+              <a:t>11/7/2016</a:t>
             </a:fld>
             <a:endParaRPr lang="en-US"/>
           </a:p>
@@ -1318,7 +1323,7 @@
           <a:p>
             <a:fld id="{543FFB24-F10E-4FC0-B071-004DD38FB1BB}" type="datetimeFigureOut">
               <a:rPr lang="en-US" smtClean="0"/>
-              <a:t>19-Oct-16</a:t>
+              <a:t>11/7/2016</a:t>
             </a:fld>
             <a:endParaRPr lang="en-US"/>
           </a:p>
@@ -1593,7 +1598,7 @@
           <a:p>
             <a:fld id="{543FFB24-F10E-4FC0-B071-004DD38FB1BB}" type="datetimeFigureOut">
               <a:rPr lang="en-US" smtClean="0"/>
-              <a:t>19-Oct-16</a:t>
+              <a:t>11/7/2016</a:t>
             </a:fld>
             <a:endParaRPr lang="en-US"/>
           </a:p>
@@ -1972,7 +1977,7 @@
           <a:p>
             <a:fld id="{543FFB24-F10E-4FC0-B071-004DD38FB1BB}" type="datetimeFigureOut">
               <a:rPr lang="en-US" smtClean="0"/>
-              <a:t>19-Oct-16</a:t>
+              <a:t>11/7/2016</a:t>
             </a:fld>
             <a:endParaRPr lang="en-US"/>
           </a:p>
@@ -2090,7 +2095,7 @@
           <a:p>
             <a:fld id="{543FFB24-F10E-4FC0-B071-004DD38FB1BB}" type="datetimeFigureOut">
               <a:rPr lang="en-US" smtClean="0"/>
-              <a:t>19-Oct-16</a:t>
+              <a:t>11/7/2016</a:t>
             </a:fld>
             <a:endParaRPr lang="en-US"/>
           </a:p>
@@ -2261,7 +2266,7 @@
           <a:p>
             <a:fld id="{543FFB24-F10E-4FC0-B071-004DD38FB1BB}" type="datetimeFigureOut">
               <a:rPr lang="en-US" smtClean="0"/>
-              <a:t>19-Oct-16</a:t>
+              <a:t>11/7/2016</a:t>
             </a:fld>
             <a:endParaRPr lang="en-US"/>
           </a:p>
@@ -2615,7 +2620,7 @@
           <a:p>
             <a:fld id="{543FFB24-F10E-4FC0-B071-004DD38FB1BB}" type="datetimeFigureOut">
               <a:rPr lang="en-US" smtClean="0"/>
-              <a:t>19-Oct-16</a:t>
+              <a:t>11/7/2016</a:t>
             </a:fld>
             <a:endParaRPr lang="en-US"/>
           </a:p>
@@ -2997,7 +3002,7 @@
           <a:p>
             <a:fld id="{543FFB24-F10E-4FC0-B071-004DD38FB1BB}" type="datetimeFigureOut">
               <a:rPr lang="en-US" smtClean="0"/>
-              <a:t>19-Oct-16</a:t>
+              <a:t>11/7/2016</a:t>
             </a:fld>
             <a:endParaRPr lang="en-US"/>
           </a:p>
@@ -3284,7 +3289,7 @@
           <a:p>
             <a:fld id="{543FFB24-F10E-4FC0-B071-004DD38FB1BB}" type="datetimeFigureOut">
               <a:rPr lang="en-US" smtClean="0"/>
-              <a:t>19-Oct-16</a:t>
+              <a:t>11/7/2016</a:t>
             </a:fld>
             <a:endParaRPr lang="en-US"/>
           </a:p>
@@ -4009,7 +4014,39 @@
           <a:p>
             <a:r>
               <a:rPr lang="en-US" dirty="0" smtClean="0"/>
-              <a:t>We used the MNIST database of handwritten digits.</a:t>
+              <a:t>We used the </a:t>
+            </a:r>
+            <a:r>
+              <a:rPr lang="en-US" dirty="0" smtClean="0"/>
+              <a:t>publicly available MNIST (</a:t>
+            </a:r>
+            <a:r>
+              <a:rPr lang="en-IN" dirty="0">
+                <a:solidFill>
+                  <a:schemeClr val="accent1"/>
+                </a:solidFill>
+              </a:rPr>
+              <a:t>Mixed National Institute of Standards and </a:t>
+            </a:r>
+            <a:r>
+              <a:rPr lang="en-IN" dirty="0" smtClean="0">
+                <a:solidFill>
+                  <a:schemeClr val="accent1"/>
+                </a:solidFill>
+              </a:rPr>
+              <a:t>Technology</a:t>
+            </a:r>
+            <a:r>
+              <a:rPr lang="en-IN" dirty="0" smtClean="0"/>
+              <a:t>)</a:t>
+            </a:r>
+            <a:r>
+              <a:rPr lang="en-US" dirty="0" smtClean="0"/>
+              <a:t> </a:t>
+            </a:r>
+            <a:r>
+              <a:rPr lang="en-US" dirty="0" smtClean="0"/>
+              <a:t>database of handwritten digits.</a:t>
             </a:r>
           </a:p>
           <a:p>
@@ -4021,7 +4058,23 @@
           <a:p>
             <a:r>
               <a:rPr lang="en-US" dirty="0" smtClean="0"/>
-              <a:t>The MNIST database contains images of size 28 x 28 each. They are grayscale ranging from 0-255.</a:t>
+              <a:t>The MNIST database contains images of size 28 x 28 </a:t>
+            </a:r>
+            <a:r>
+              <a:rPr lang="en-US" dirty="0" smtClean="0"/>
+              <a:t>pixels each</a:t>
+            </a:r>
+            <a:r>
+              <a:rPr lang="en-US" dirty="0" smtClean="0"/>
+              <a:t>. They are </a:t>
+            </a:r>
+            <a:r>
+              <a:rPr lang="en-US" dirty="0" smtClean="0"/>
+              <a:t>8-bit grayscale images with intensities ranging </a:t>
+            </a:r>
+            <a:r>
+              <a:rPr lang="en-US" dirty="0" smtClean="0"/>
+              <a:t>from 0-255.</a:t>
             </a:r>
           </a:p>
           <a:p>
@@ -4316,7 +4369,12 @@
             <p:ph sz="half" idx="1"/>
           </p:nvPr>
         </p:nvSpPr>
-        <p:spPr/>
+        <p:spPr>
+          <a:xfrm>
+            <a:off x="1097279" y="1845734"/>
+            <a:ext cx="4799696" cy="4023360"/>
+          </a:xfrm>
+        </p:spPr>
         <p:txBody>
           <a:bodyPr>
             <a:normAutofit/>
@@ -4346,8 +4404,22 @@
           <a:p>
             <a:r>
               <a:rPr lang="en-US" dirty="0" smtClean="0"/>
-              <a:t>Number of hidden nodes = 20</a:t>
-            </a:r>
+              <a:t>Number of hidden nodes = </a:t>
+            </a:r>
+            <a:r>
+              <a:rPr lang="en-US" dirty="0" smtClean="0"/>
+              <a:t>100</a:t>
+            </a:r>
+          </a:p>
+          <a:p>
+            <a:endParaRPr lang="en-US" dirty="0"/>
+          </a:p>
+          <a:p>
+            <a:r>
+              <a:rPr lang="en-US" dirty="0" smtClean="0"/>
+              <a:t>In addition, each layer except output layer has a bias unit with input value fixed at 1.</a:t>
+            </a:r>
+            <a:endParaRPr lang="en-US" dirty="0"/>
           </a:p>
         </p:txBody>
       </p:sp>
@@ -4432,12 +4504,16 @@
           <a:p>
             <a:pPr algn="ctr"/>
             <a:r>
-              <a:rPr lang="en-US" sz="1200" dirty="0"/>
-              <a:t>2</a:t>
-            </a:r>
-            <a:r>
               <a:rPr lang="en-US" sz="1200" dirty="0" smtClean="0"/>
-              <a:t>0 nodes</a:t>
+              <a:t>10</a:t>
+            </a:r>
+            <a:r>
+              <a:rPr lang="en-US" sz="1200" dirty="0" smtClean="0"/>
+              <a:t>0 </a:t>
+            </a:r>
+            <a:r>
+              <a:rPr lang="en-US" sz="1200" dirty="0" smtClean="0"/>
+              <a:t>nodes</a:t>
             </a:r>
             <a:endParaRPr lang="en-US" sz="1200" dirty="0"/>
           </a:p>
@@ -4561,8 +4637,8 @@
         </p:nvSpPr>
         <p:spPr>
           <a:xfrm>
-            <a:off x="6821075" y="3393069"/>
-            <a:ext cx="715260" cy="276999"/>
+            <a:off x="6726186" y="3393069"/>
+            <a:ext cx="793807" cy="276999"/>
           </a:xfrm>
           <a:prstGeom prst="rect">
             <a:avLst/>
@@ -4577,7 +4653,11 @@
           <a:p>
             <a:r>
               <a:rPr lang="en-US" sz="1200" dirty="0" smtClean="0"/>
-              <a:t>20 x 785</a:t>
+              <a:t>100 </a:t>
+            </a:r>
+            <a:r>
+              <a:rPr lang="en-US" sz="1200" dirty="0" smtClean="0"/>
+              <a:t>x 785</a:t>
             </a:r>
             <a:endParaRPr lang="en-US" sz="1200" dirty="0"/>
           </a:p>
@@ -4591,8 +4671,8 @@
         </p:nvSpPr>
         <p:spPr>
           <a:xfrm>
-            <a:off x="8539192" y="3393068"/>
-            <a:ext cx="636713" cy="276999"/>
+            <a:off x="8461557" y="3393068"/>
+            <a:ext cx="715260" cy="276999"/>
           </a:xfrm>
           <a:prstGeom prst="rect">
             <a:avLst/>
@@ -4607,7 +4687,11 @@
           <a:p>
             <a:r>
               <a:rPr lang="en-US" sz="1200" dirty="0" smtClean="0"/>
-              <a:t>21 x 10</a:t>
+              <a:t>101 </a:t>
+            </a:r>
+            <a:r>
+              <a:rPr lang="en-US" sz="1200" dirty="0" smtClean="0"/>
+              <a:t>x 10</a:t>
             </a:r>
             <a:endParaRPr lang="en-US" sz="1200" dirty="0"/>
           </a:p>
@@ -4667,7 +4751,7 @@
           <a:p>
             <a:r>
               <a:rPr lang="en-US" dirty="0" smtClean="0"/>
-              <a:t>Results</a:t>
+              <a:t>Results and real-life experimentation</a:t>
             </a:r>
             <a:endParaRPr lang="en-US" dirty="0"/>
           </a:p>
@@ -4680,7 +4764,7 @@
             <a:spLocks noGrp="1"/>
           </p:cNvSpPr>
           <p:nvPr>
-            <p:ph idx="1"/>
+            <p:ph sz="half" idx="1"/>
           </p:nvPr>
         </p:nvSpPr>
         <p:spPr/>
@@ -4690,36 +4774,108 @@
           <a:p>
             <a:r>
               <a:rPr lang="en-US" dirty="0" smtClean="0"/>
-              <a:t>The current implementation achieves</a:t>
-            </a:r>
+              <a:t>The current implementation </a:t>
+            </a:r>
+            <a:r>
+              <a:rPr lang="en-US" dirty="0" smtClean="0"/>
+              <a:t>based on MNIST database achieves</a:t>
+            </a:r>
+            <a:endParaRPr lang="en-US" dirty="0" smtClean="0"/>
           </a:p>
           <a:p>
             <a:pPr lvl="1"/>
             <a:r>
               <a:rPr lang="en-US" dirty="0" smtClean="0"/>
-              <a:t>~82% for training accuracy</a:t>
+              <a:t>~95% </a:t>
+            </a:r>
+            <a:r>
+              <a:rPr lang="en-US" dirty="0" smtClean="0"/>
+              <a:t>for training accuracy</a:t>
             </a:r>
           </a:p>
           <a:p>
             <a:pPr lvl="1"/>
             <a:r>
               <a:rPr lang="en-US" dirty="0" smtClean="0"/>
-              <a:t>~79% for testing accuracy</a:t>
-            </a:r>
-          </a:p>
-          <a:p>
-            <a:pPr lvl="1"/>
+              <a:t>~93% </a:t>
+            </a:r>
+            <a:r>
+              <a:rPr lang="en-US" dirty="0" smtClean="0"/>
+              <a:t>for testing accuracy</a:t>
+            </a:r>
+          </a:p>
+          <a:p>
+            <a:pPr marL="201168" lvl="1" indent="0">
+              <a:buNone/>
+            </a:pPr>
+            <a:r>
+              <a:rPr lang="en-US" dirty="0" smtClean="0"/>
+              <a:t>Which is appreciably good for a simple back-propagation network used.</a:t>
+            </a:r>
             <a:endParaRPr lang="en-US" dirty="0"/>
           </a:p>
           <a:p>
+            <a:pPr algn="just"/>
             <a:r>
               <a:rPr lang="en-US" dirty="0" smtClean="0"/>
-              <a:t>We are also investigating network performance with real pictures of digits, with pre-processing as required.</a:t>
+              <a:t>We </a:t>
+            </a:r>
+            <a:r>
+              <a:rPr lang="en-US" dirty="0" smtClean="0"/>
+              <a:t>also </a:t>
+            </a:r>
+            <a:r>
+              <a:rPr lang="en-US" dirty="0" smtClean="0"/>
+              <a:t>investigate </a:t>
+            </a:r>
+            <a:r>
+              <a:rPr lang="en-US" dirty="0" smtClean="0"/>
+              <a:t>network performance with real pictures of digits, with pre-processing as required</a:t>
+            </a:r>
+            <a:r>
+              <a:rPr lang="en-US" dirty="0" smtClean="0"/>
+              <a:t>. Basically, the color images taken from a regular camera are converted to gray-scale and smoothened, and finally </a:t>
+            </a:r>
+            <a:r>
+              <a:rPr lang="en-US" dirty="0" err="1" smtClean="0"/>
+              <a:t>thresholded</a:t>
+            </a:r>
+            <a:r>
+              <a:rPr lang="en-US" dirty="0" smtClean="0"/>
+              <a:t> appropriately to feed into the network.</a:t>
             </a:r>
             <a:endParaRPr lang="en-US" dirty="0"/>
           </a:p>
         </p:txBody>
       </p:sp>
+      <p:pic>
+        <p:nvPicPr>
+          <p:cNvPr id="4" name="Content Placeholder 3"/>
+          <p:cNvPicPr>
+            <a:picLocks noGrp="1" noChangeAspect="1"/>
+          </p:cNvPicPr>
+          <p:nvPr>
+            <p:ph sz="half" idx="2"/>
+          </p:nvPr>
+        </p:nvPicPr>
+        <p:blipFill rotWithShape="1">
+          <a:blip r:embed="rId2">
+            <a:extLst>
+              <a:ext uri="{28A0092B-C50C-407E-A947-70E740481C1C}">
+                <a14:useLocalDpi xmlns:a14="http://schemas.microsoft.com/office/drawing/2010/main" val="0"/>
+              </a:ext>
+            </a:extLst>
+          </a:blip>
+          <a:srcRect l="6843" t="4956" r="5619" b="1648"/>
+          <a:stretch/>
+        </p:blipFill>
+        <p:spPr>
+          <a:xfrm>
+            <a:off x="6262776" y="1897570"/>
+            <a:ext cx="4892903" cy="4033471"/>
+          </a:xfrm>
+        </p:spPr>
+      </p:pic>
     </p:spTree>
     <p:extLst>
       <p:ext uri="{BB962C8B-B14F-4D97-AF65-F5344CB8AC3E}">

</xml_diff>

<commit_message>
Minor updates to Review 2 PPT
</commit_message>
<xml_diff>
--- a/docs/Neural Review 2.pptx
+++ b/docs/Neural Review 2.pptx
@@ -9,7 +9,8 @@
     <p:sldId id="259" r:id="rId3"/>
     <p:sldId id="258" r:id="rId4"/>
     <p:sldId id="257" r:id="rId5"/>
-    <p:sldId id="260" r:id="rId6"/>
+    <p:sldId id="262" r:id="rId6"/>
+    <p:sldId id="260" r:id="rId7"/>
   </p:sldIdLst>
   <p:sldSz cx="12192000" cy="6858000"/>
   <p:notesSz cx="6858000" cy="9144000"/>
@@ -342,7 +343,7 @@
           <a:p>
             <a:fld id="{543FFB24-F10E-4FC0-B071-004DD38FB1BB}" type="datetimeFigureOut">
               <a:rPr lang="en-US" smtClean="0"/>
-              <a:t>11/7/2016</a:t>
+              <a:t>07-Nov-16</a:t>
             </a:fld>
             <a:endParaRPr lang="en-US"/>
           </a:p>
@@ -550,7 +551,7 @@
           <a:p>
             <a:fld id="{543FFB24-F10E-4FC0-B071-004DD38FB1BB}" type="datetimeFigureOut">
               <a:rPr lang="en-US" smtClean="0"/>
-              <a:t>11/7/2016</a:t>
+              <a:t>07-Nov-16</a:t>
             </a:fld>
             <a:endParaRPr lang="en-US"/>
           </a:p>
@@ -806,7 +807,7 @@
           <a:p>
             <a:fld id="{543FFB24-F10E-4FC0-B071-004DD38FB1BB}" type="datetimeFigureOut">
               <a:rPr lang="en-US" smtClean="0"/>
-              <a:t>11/7/2016</a:t>
+              <a:t>07-Nov-16</a:t>
             </a:fld>
             <a:endParaRPr lang="en-US"/>
           </a:p>
@@ -980,7 +981,7 @@
           <a:p>
             <a:fld id="{543FFB24-F10E-4FC0-B071-004DD38FB1BB}" type="datetimeFigureOut">
               <a:rPr lang="en-US" smtClean="0"/>
-              <a:t>11/7/2016</a:t>
+              <a:t>07-Nov-16</a:t>
             </a:fld>
             <a:endParaRPr lang="en-US"/>
           </a:p>
@@ -1323,7 +1324,7 @@
           <a:p>
             <a:fld id="{543FFB24-F10E-4FC0-B071-004DD38FB1BB}" type="datetimeFigureOut">
               <a:rPr lang="en-US" smtClean="0"/>
-              <a:t>11/7/2016</a:t>
+              <a:t>07-Nov-16</a:t>
             </a:fld>
             <a:endParaRPr lang="en-US"/>
           </a:p>
@@ -1598,7 +1599,7 @@
           <a:p>
             <a:fld id="{543FFB24-F10E-4FC0-B071-004DD38FB1BB}" type="datetimeFigureOut">
               <a:rPr lang="en-US" smtClean="0"/>
-              <a:t>11/7/2016</a:t>
+              <a:t>07-Nov-16</a:t>
             </a:fld>
             <a:endParaRPr lang="en-US"/>
           </a:p>
@@ -1977,7 +1978,7 @@
           <a:p>
             <a:fld id="{543FFB24-F10E-4FC0-B071-004DD38FB1BB}" type="datetimeFigureOut">
               <a:rPr lang="en-US" smtClean="0"/>
-              <a:t>11/7/2016</a:t>
+              <a:t>07-Nov-16</a:t>
             </a:fld>
             <a:endParaRPr lang="en-US"/>
           </a:p>
@@ -2095,7 +2096,7 @@
           <a:p>
             <a:fld id="{543FFB24-F10E-4FC0-B071-004DD38FB1BB}" type="datetimeFigureOut">
               <a:rPr lang="en-US" smtClean="0"/>
-              <a:t>11/7/2016</a:t>
+              <a:t>07-Nov-16</a:t>
             </a:fld>
             <a:endParaRPr lang="en-US"/>
           </a:p>
@@ -2266,7 +2267,7 @@
           <a:p>
             <a:fld id="{543FFB24-F10E-4FC0-B071-004DD38FB1BB}" type="datetimeFigureOut">
               <a:rPr lang="en-US" smtClean="0"/>
-              <a:t>11/7/2016</a:t>
+              <a:t>07-Nov-16</a:t>
             </a:fld>
             <a:endParaRPr lang="en-US"/>
           </a:p>
@@ -2620,7 +2621,7 @@
           <a:p>
             <a:fld id="{543FFB24-F10E-4FC0-B071-004DD38FB1BB}" type="datetimeFigureOut">
               <a:rPr lang="en-US" smtClean="0"/>
-              <a:t>11/7/2016</a:t>
+              <a:t>07-Nov-16</a:t>
             </a:fld>
             <a:endParaRPr lang="en-US"/>
           </a:p>
@@ -3002,7 +3003,7 @@
           <a:p>
             <a:fld id="{543FFB24-F10E-4FC0-B071-004DD38FB1BB}" type="datetimeFigureOut">
               <a:rPr lang="en-US" smtClean="0"/>
-              <a:t>11/7/2016</a:t>
+              <a:t>07-Nov-16</a:t>
             </a:fld>
             <a:endParaRPr lang="en-US"/>
           </a:p>
@@ -3289,7 +3290,7 @@
           <a:p>
             <a:fld id="{543FFB24-F10E-4FC0-B071-004DD38FB1BB}" type="datetimeFigureOut">
               <a:rPr lang="en-US" smtClean="0"/>
-              <a:t>11/7/2016</a:t>
+              <a:t>07-Nov-16</a:t>
             </a:fld>
             <a:endParaRPr lang="en-US"/>
           </a:p>
@@ -3853,7 +3854,11 @@
           <a:p>
             <a:r>
               <a:rPr lang="en-US" dirty="0" smtClean="0"/>
-              <a:t>Neural Networks and Fuzzy Control</a:t>
+              <a:t>ECE407: Neural </a:t>
+            </a:r>
+            <a:r>
+              <a:rPr lang="en-US" dirty="0" smtClean="0"/>
+              <a:t>Networks and Fuzzy Control</a:t>
             </a:r>
             <a:endParaRPr lang="en-US" dirty="0"/>
           </a:p>
@@ -3868,7 +3873,7 @@
         <p:spPr>
           <a:xfrm>
             <a:off x="485192" y="531844"/>
-            <a:ext cx="2213491" cy="646331"/>
+            <a:ext cx="3060197" cy="646331"/>
           </a:xfrm>
           <a:prstGeom prst="rect">
             <a:avLst/>
@@ -3882,14 +3887,26 @@
           <a:lstStyle/>
           <a:p>
             <a:r>
+              <a:rPr lang="en-US" b="1" dirty="0" smtClean="0"/>
+              <a:t>Faculty: </a:t>
+            </a:r>
+            <a:r>
               <a:rPr lang="en-US" dirty="0" smtClean="0"/>
-              <a:t>Prof. Sankar Ganesh S</a:t>
-            </a:r>
-          </a:p>
-          <a:p>
+              <a:t>Prof</a:t>
+            </a:r>
             <a:r>
               <a:rPr lang="en-US" dirty="0" smtClean="0"/>
-              <a:t>Slot E1, E2</a:t>
+              <a:t>. Sankar Ganesh S</a:t>
+            </a:r>
+          </a:p>
+          <a:p>
+            <a:r>
+              <a:rPr lang="en-US" b="1" dirty="0" smtClean="0"/>
+              <a:t>Slots: </a:t>
+            </a:r>
+            <a:r>
+              <a:rPr lang="en-US" dirty="0" smtClean="0"/>
+              <a:t>E1, E2</a:t>
             </a:r>
             <a:endParaRPr lang="en-US" dirty="0"/>
           </a:p>
@@ -3903,8 +3920,8 @@
         </p:nvSpPr>
         <p:spPr>
           <a:xfrm>
-            <a:off x="10389055" y="393344"/>
-            <a:ext cx="1244764" cy="923330"/>
+            <a:off x="8146473" y="393344"/>
+            <a:ext cx="3487346" cy="923330"/>
           </a:xfrm>
           <a:prstGeom prst="rect">
             <a:avLst/>
@@ -3912,26 +3929,28 @@
           <a:noFill/>
         </p:spPr>
         <p:txBody>
-          <a:bodyPr wrap="none" rtlCol="0">
+          <a:bodyPr wrap="square" rtlCol="0">
             <a:spAutoFit/>
           </a:bodyPr>
           <a:lstStyle/>
           <a:p>
             <a:r>
               <a:rPr lang="en-US" dirty="0" smtClean="0"/>
-              <a:t>13BEC0107</a:t>
-            </a:r>
+              <a:t>Aman Sardana (13BEC0107)</a:t>
+            </a:r>
+            <a:endParaRPr lang="en-US" dirty="0" smtClean="0"/>
           </a:p>
           <a:p>
             <a:r>
               <a:rPr lang="en-US" dirty="0" smtClean="0"/>
-              <a:t>13BEC0390</a:t>
-            </a:r>
+              <a:t>Rakshith Manandi (13BEC0390)</a:t>
+            </a:r>
+            <a:endParaRPr lang="en-US" dirty="0" smtClean="0"/>
           </a:p>
           <a:p>
             <a:r>
               <a:rPr lang="en-US" dirty="0" smtClean="0"/>
-              <a:t>13BEC0749</a:t>
+              <a:t>Vinay Gupta (13BEC0749)</a:t>
             </a:r>
             <a:endParaRPr lang="en-US" dirty="0"/>
           </a:p>
@@ -4014,11 +4033,7 @@
           <a:p>
             <a:r>
               <a:rPr lang="en-US" dirty="0" smtClean="0"/>
-              <a:t>We used the </a:t>
-            </a:r>
-            <a:r>
-              <a:rPr lang="en-US" dirty="0" smtClean="0"/>
-              <a:t>publicly available MNIST (</a:t>
+              <a:t>We used the publicly available MNIST (</a:t>
             </a:r>
             <a:r>
               <a:rPr lang="en-IN" dirty="0">
@@ -4042,11 +4057,7 @@
             </a:r>
             <a:r>
               <a:rPr lang="en-US" dirty="0" smtClean="0"/>
-              <a:t> </a:t>
-            </a:r>
-            <a:r>
-              <a:rPr lang="en-US" dirty="0" smtClean="0"/>
-              <a:t>database of handwritten digits.</a:t>
+              <a:t> database of handwritten digits.</a:t>
             </a:r>
           </a:p>
           <a:p>
@@ -4058,23 +4069,7 @@
           <a:p>
             <a:r>
               <a:rPr lang="en-US" dirty="0" smtClean="0"/>
-              <a:t>The MNIST database contains images of size 28 x 28 </a:t>
-            </a:r>
-            <a:r>
-              <a:rPr lang="en-US" dirty="0" smtClean="0"/>
-              <a:t>pixels each</a:t>
-            </a:r>
-            <a:r>
-              <a:rPr lang="en-US" dirty="0" smtClean="0"/>
-              <a:t>. They are </a:t>
-            </a:r>
-            <a:r>
-              <a:rPr lang="en-US" dirty="0" smtClean="0"/>
-              <a:t>8-bit grayscale images with intensities ranging </a:t>
-            </a:r>
-            <a:r>
-              <a:rPr lang="en-US" dirty="0" smtClean="0"/>
-              <a:t>from 0-255.</a:t>
+              <a:t>The MNIST database contains images of size 28 x 28 pixels each. They are 8-bit grayscale images with intensities ranging from 0-255.</a:t>
             </a:r>
           </a:p>
           <a:p>
@@ -4284,8 +4279,61 @@
           <a:p>
             <a:r>
               <a:rPr lang="en-US" dirty="0" smtClean="0"/>
-              <a:t>Where alpha is the learning rate, t is the target, y is the output. g is the sigmoid activation function. The weights are optimized using the conjugate gradient function, using back propagation algorithm.</a:t>
-            </a:r>
+              <a:t>Where </a:t>
+            </a:r>
+            <a:r>
+              <a:rPr lang="en-US" i="1" dirty="0" smtClean="0"/>
+              <a:t>alpha</a:t>
+            </a:r>
+            <a:r>
+              <a:rPr lang="en-US" dirty="0" smtClean="0"/>
+              <a:t> is the learning rate, </a:t>
+            </a:r>
+            <a:r>
+              <a:rPr lang="en-US" i="1" dirty="0" smtClean="0"/>
+              <a:t>t</a:t>
+            </a:r>
+            <a:r>
+              <a:rPr lang="en-US" dirty="0" smtClean="0"/>
+              <a:t> is the target, </a:t>
+            </a:r>
+            <a:r>
+              <a:rPr lang="en-US" i="1" dirty="0" smtClean="0"/>
+              <a:t>y</a:t>
+            </a:r>
+            <a:r>
+              <a:rPr lang="en-US" dirty="0" smtClean="0"/>
+              <a:t> is the output. </a:t>
+            </a:r>
+            <a:r>
+              <a:rPr lang="en-US" i="1" dirty="0" smtClean="0"/>
+              <a:t>g</a:t>
+            </a:r>
+            <a:r>
+              <a:rPr lang="en-US" dirty="0" smtClean="0"/>
+              <a:t> is the sigmoid activation function. The weights are optimized using the </a:t>
+            </a:r>
+            <a:r>
+              <a:rPr lang="en-US" i="1" dirty="0" smtClean="0"/>
+              <a:t>conjugate gradient function</a:t>
+            </a:r>
+            <a:r>
+              <a:rPr lang="en-US" dirty="0" smtClean="0"/>
+              <a:t>, </a:t>
+            </a:r>
+            <a:r>
+              <a:rPr lang="en-US" dirty="0" smtClean="0"/>
+              <a:t>using </a:t>
+            </a:r>
+            <a:r>
+              <a:rPr lang="en-US" i="1" dirty="0" smtClean="0"/>
+              <a:t>back propagation algorithm</a:t>
+            </a:r>
+            <a:r>
+              <a:rPr lang="en-US" dirty="0" smtClean="0"/>
+              <a:t>.</a:t>
+            </a:r>
+            <a:endParaRPr lang="en-US" dirty="0" smtClean="0"/>
           </a:p>
           <a:p>
             <a:endParaRPr lang="en-US" dirty="0"/>
@@ -4404,11 +4452,7 @@
           <a:p>
             <a:r>
               <a:rPr lang="en-US" dirty="0" smtClean="0"/>
-              <a:t>Number of hidden nodes = </a:t>
-            </a:r>
-            <a:r>
-              <a:rPr lang="en-US" dirty="0" smtClean="0"/>
-              <a:t>100</a:t>
+              <a:t>Number of hidden nodes = 100</a:t>
             </a:r>
           </a:p>
           <a:p>
@@ -4505,15 +4549,7 @@
             <a:pPr algn="ctr"/>
             <a:r>
               <a:rPr lang="en-US" sz="1200" dirty="0" smtClean="0"/>
-              <a:t>10</a:t>
-            </a:r>
-            <a:r>
-              <a:rPr lang="en-US" sz="1200" dirty="0" smtClean="0"/>
-              <a:t>0 </a:t>
-            </a:r>
-            <a:r>
-              <a:rPr lang="en-US" sz="1200" dirty="0" smtClean="0"/>
-              <a:t>nodes</a:t>
+              <a:t>100 nodes</a:t>
             </a:r>
             <a:endParaRPr lang="en-US" sz="1200" dirty="0"/>
           </a:p>
@@ -4653,11 +4689,7 @@
           <a:p>
             <a:r>
               <a:rPr lang="en-US" sz="1200" dirty="0" smtClean="0"/>
-              <a:t>100 </a:t>
-            </a:r>
-            <a:r>
-              <a:rPr lang="en-US" sz="1200" dirty="0" smtClean="0"/>
-              <a:t>x 785</a:t>
+              <a:t>100 x 785</a:t>
             </a:r>
             <a:endParaRPr lang="en-US" sz="1200" dirty="0"/>
           </a:p>
@@ -4687,11 +4719,7 @@
           <a:p>
             <a:r>
               <a:rPr lang="en-US" sz="1200" dirty="0" smtClean="0"/>
-              <a:t>101 </a:t>
-            </a:r>
-            <a:r>
-              <a:rPr lang="en-US" sz="1200" dirty="0" smtClean="0"/>
-              <a:t>x 10</a:t>
+              <a:t>101 x 10</a:t>
             </a:r>
             <a:endParaRPr lang="en-US" sz="1200" dirty="0"/>
           </a:p>
@@ -4751,6 +4779,122 @@
           <a:p>
             <a:r>
               <a:rPr lang="en-US" dirty="0" smtClean="0"/>
+              <a:t>Results from Review 1 (19/10/2016)</a:t>
+            </a:r>
+            <a:endParaRPr lang="en-US" dirty="0"/>
+          </a:p>
+        </p:txBody>
+      </p:sp>
+      <p:sp>
+        <p:nvSpPr>
+          <p:cNvPr id="6" name="Content Placeholder 5"/>
+          <p:cNvSpPr>
+            <a:spLocks noGrp="1"/>
+          </p:cNvSpPr>
+          <p:nvPr>
+            <p:ph idx="1"/>
+          </p:nvPr>
+        </p:nvSpPr>
+        <p:spPr/>
+        <p:txBody>
+          <a:bodyPr/>
+          <a:lstStyle/>
+          <a:p>
+            <a:r>
+              <a:rPr lang="en-US" dirty="0" smtClean="0"/>
+              <a:t>Our implementation achieved </a:t>
+            </a:r>
+            <a:endParaRPr lang="en-US" dirty="0" smtClean="0"/>
+          </a:p>
+          <a:p>
+            <a:pPr lvl="1"/>
+            <a:r>
+              <a:rPr lang="en-US" dirty="0" smtClean="0"/>
+              <a:t>~82% for training accuracy</a:t>
+            </a:r>
+          </a:p>
+          <a:p>
+            <a:pPr lvl="1"/>
+            <a:r>
+              <a:rPr lang="en-US" dirty="0" smtClean="0"/>
+              <a:t>~79% for testing accuracy</a:t>
+            </a:r>
+          </a:p>
+          <a:p>
+            <a:pPr lvl="1"/>
+            <a:endParaRPr lang="en-US" dirty="0"/>
+          </a:p>
+          <a:p>
+            <a:r>
+              <a:rPr lang="en-US" dirty="0" smtClean="0"/>
+              <a:t>We </a:t>
+            </a:r>
+            <a:r>
+              <a:rPr lang="en-US" dirty="0" smtClean="0"/>
+              <a:t>also planned to investigate </a:t>
+            </a:r>
+            <a:r>
+              <a:rPr lang="en-US" dirty="0" smtClean="0"/>
+              <a:t>network performance with real pictures of digits, with pre-processing as required.</a:t>
+            </a:r>
+            <a:endParaRPr lang="en-US" dirty="0"/>
+          </a:p>
+        </p:txBody>
+      </p:sp>
+    </p:spTree>
+    <p:extLst>
+      <p:ext uri="{BB962C8B-B14F-4D97-AF65-F5344CB8AC3E}">
+        <p14:creationId xmlns:p14="http://schemas.microsoft.com/office/powerpoint/2010/main" val="2987042803"/>
+      </p:ext>
+    </p:extLst>
+  </p:cSld>
+  <p:clrMapOvr>
+    <a:masterClrMapping/>
+  </p:clrMapOvr>
+  <p:timing>
+    <p:tnLst>
+      <p:par>
+        <p:cTn id="1" dur="indefinite" restart="never" nodeType="tmRoot"/>
+      </p:par>
+    </p:tnLst>
+  </p:timing>
+</p:sld>
+</file>
+
+<file path=ppt/slides/slide6.xml><?xml version="1.0" encoding="utf-8"?>
+<p:sld xmlns:a="http://schemas.openxmlformats.org/drawingml/2006/main" xmlns:r="http://schemas.openxmlformats.org/officeDocument/2006/relationships" xmlns:p="http://schemas.openxmlformats.org/presentationml/2006/main">
+  <p:cSld>
+    <p:spTree>
+      <p:nvGrpSpPr>
+        <p:cNvPr id="1" name=""/>
+        <p:cNvGrpSpPr/>
+        <p:nvPr/>
+      </p:nvGrpSpPr>
+      <p:grpSpPr>
+        <a:xfrm>
+          <a:off x="0" y="0"/>
+          <a:ext cx="0" cy="0"/>
+          <a:chOff x="0" y="0"/>
+          <a:chExt cx="0" cy="0"/>
+        </a:xfrm>
+      </p:grpSpPr>
+      <p:sp>
+        <p:nvSpPr>
+          <p:cNvPr id="5" name="Title 4"/>
+          <p:cNvSpPr>
+            <a:spLocks noGrp="1"/>
+          </p:cNvSpPr>
+          <p:nvPr>
+            <p:ph type="title"/>
+          </p:nvPr>
+        </p:nvSpPr>
+        <p:spPr/>
+        <p:txBody>
+          <a:bodyPr/>
+          <a:lstStyle/>
+          <a:p>
+            <a:r>
+              <a:rPr lang="en-US" dirty="0" smtClean="0"/>
               <a:t>Results and real-life experimentation</a:t>
             </a:r>
             <a:endParaRPr lang="en-US" dirty="0"/>
@@ -4774,34 +4918,21 @@
           <a:p>
             <a:r>
               <a:rPr lang="en-US" dirty="0" smtClean="0"/>
-              <a:t>The current implementation </a:t>
-            </a:r>
+              <a:t>The current implementation based on MNIST database achieves</a:t>
+            </a:r>
+          </a:p>
+          <a:p>
+            <a:pPr lvl="1"/>
             <a:r>
               <a:rPr lang="en-US" dirty="0" smtClean="0"/>
-              <a:t>based on MNIST database achieves</a:t>
-            </a:r>
-            <a:endParaRPr lang="en-US" dirty="0" smtClean="0"/>
+              <a:t>~95% for training accuracy</a:t>
+            </a:r>
           </a:p>
           <a:p>
             <a:pPr lvl="1"/>
             <a:r>
               <a:rPr lang="en-US" dirty="0" smtClean="0"/>
-              <a:t>~95% </a:t>
-            </a:r>
-            <a:r>
-              <a:rPr lang="en-US" dirty="0" smtClean="0"/>
-              <a:t>for training accuracy</a:t>
-            </a:r>
-          </a:p>
-          <a:p>
-            <a:pPr lvl="1"/>
-            <a:r>
-              <a:rPr lang="en-US" dirty="0" smtClean="0"/>
-              <a:t>~93% </a:t>
-            </a:r>
-            <a:r>
-              <a:rPr lang="en-US" dirty="0" smtClean="0"/>
-              <a:t>for testing accuracy</a:t>
+              <a:t>~93% for testing accuracy</a:t>
             </a:r>
           </a:p>
           <a:p>
@@ -4818,31 +4949,7 @@
             <a:pPr algn="just"/>
             <a:r>
               <a:rPr lang="en-US" dirty="0" smtClean="0"/>
-              <a:t>We </a:t>
-            </a:r>
-            <a:r>
-              <a:rPr lang="en-US" dirty="0" smtClean="0"/>
-              <a:t>also </a:t>
-            </a:r>
-            <a:r>
-              <a:rPr lang="en-US" dirty="0" smtClean="0"/>
-              <a:t>investigate </a:t>
-            </a:r>
-            <a:r>
-              <a:rPr lang="en-US" dirty="0" smtClean="0"/>
-              <a:t>network performance with real pictures of digits, with pre-processing as required</a:t>
-            </a:r>
-            <a:r>
-              <a:rPr lang="en-US" dirty="0" smtClean="0"/>
-              <a:t>. Basically, the color images taken from a regular camera are converted to gray-scale and smoothened, and finally </a:t>
-            </a:r>
-            <a:r>
-              <a:rPr lang="en-US" dirty="0" err="1" smtClean="0"/>
-              <a:t>thresholded</a:t>
-            </a:r>
-            <a:r>
-              <a:rPr lang="en-US" dirty="0" smtClean="0"/>
-              <a:t> appropriately to feed into the network.</a:t>
+              <a:t>We also investigate network performance with real pictures of digits, with pre-processing as required. Basically, the color images taken from a regular camera are converted to gray-scale and smoothened, and finally thresholded appropriately to feed into the network.</a:t>
             </a:r>
             <a:endParaRPr lang="en-US" dirty="0"/>
           </a:p>

</xml_diff>

<commit_message>
Minor adjustments to PPT and review 1 recap
</commit_message>
<xml_diff>
--- a/docs/Neural Review 2.pptx
+++ b/docs/Neural Review 2.pptx
@@ -343,7 +343,7 @@
           <a:p>
             <a:fld id="{543FFB24-F10E-4FC0-B071-004DD38FB1BB}" type="datetimeFigureOut">
               <a:rPr lang="en-US" smtClean="0"/>
-              <a:t>07-Nov-16</a:t>
+              <a:t>11/8/2016</a:t>
             </a:fld>
             <a:endParaRPr lang="en-US"/>
           </a:p>
@@ -551,7 +551,7 @@
           <a:p>
             <a:fld id="{543FFB24-F10E-4FC0-B071-004DD38FB1BB}" type="datetimeFigureOut">
               <a:rPr lang="en-US" smtClean="0"/>
-              <a:t>07-Nov-16</a:t>
+              <a:t>11/8/2016</a:t>
             </a:fld>
             <a:endParaRPr lang="en-US"/>
           </a:p>
@@ -807,7 +807,7 @@
           <a:p>
             <a:fld id="{543FFB24-F10E-4FC0-B071-004DD38FB1BB}" type="datetimeFigureOut">
               <a:rPr lang="en-US" smtClean="0"/>
-              <a:t>07-Nov-16</a:t>
+              <a:t>11/8/2016</a:t>
             </a:fld>
             <a:endParaRPr lang="en-US"/>
           </a:p>
@@ -981,7 +981,7 @@
           <a:p>
             <a:fld id="{543FFB24-F10E-4FC0-B071-004DD38FB1BB}" type="datetimeFigureOut">
               <a:rPr lang="en-US" smtClean="0"/>
-              <a:t>07-Nov-16</a:t>
+              <a:t>11/8/2016</a:t>
             </a:fld>
             <a:endParaRPr lang="en-US"/>
           </a:p>
@@ -1324,7 +1324,7 @@
           <a:p>
             <a:fld id="{543FFB24-F10E-4FC0-B071-004DD38FB1BB}" type="datetimeFigureOut">
               <a:rPr lang="en-US" smtClean="0"/>
-              <a:t>07-Nov-16</a:t>
+              <a:t>11/8/2016</a:t>
             </a:fld>
             <a:endParaRPr lang="en-US"/>
           </a:p>
@@ -1599,7 +1599,7 @@
           <a:p>
             <a:fld id="{543FFB24-F10E-4FC0-B071-004DD38FB1BB}" type="datetimeFigureOut">
               <a:rPr lang="en-US" smtClean="0"/>
-              <a:t>07-Nov-16</a:t>
+              <a:t>11/8/2016</a:t>
             </a:fld>
             <a:endParaRPr lang="en-US"/>
           </a:p>
@@ -1978,7 +1978,7 @@
           <a:p>
             <a:fld id="{543FFB24-F10E-4FC0-B071-004DD38FB1BB}" type="datetimeFigureOut">
               <a:rPr lang="en-US" smtClean="0"/>
-              <a:t>07-Nov-16</a:t>
+              <a:t>11/8/2016</a:t>
             </a:fld>
             <a:endParaRPr lang="en-US"/>
           </a:p>
@@ -2096,7 +2096,7 @@
           <a:p>
             <a:fld id="{543FFB24-F10E-4FC0-B071-004DD38FB1BB}" type="datetimeFigureOut">
               <a:rPr lang="en-US" smtClean="0"/>
-              <a:t>07-Nov-16</a:t>
+              <a:t>11/8/2016</a:t>
             </a:fld>
             <a:endParaRPr lang="en-US"/>
           </a:p>
@@ -2267,7 +2267,7 @@
           <a:p>
             <a:fld id="{543FFB24-F10E-4FC0-B071-004DD38FB1BB}" type="datetimeFigureOut">
               <a:rPr lang="en-US" smtClean="0"/>
-              <a:t>07-Nov-16</a:t>
+              <a:t>11/8/2016</a:t>
             </a:fld>
             <a:endParaRPr lang="en-US"/>
           </a:p>
@@ -2621,7 +2621,7 @@
           <a:p>
             <a:fld id="{543FFB24-F10E-4FC0-B071-004DD38FB1BB}" type="datetimeFigureOut">
               <a:rPr lang="en-US" smtClean="0"/>
-              <a:t>07-Nov-16</a:t>
+              <a:t>11/8/2016</a:t>
             </a:fld>
             <a:endParaRPr lang="en-US"/>
           </a:p>
@@ -3003,7 +3003,7 @@
           <a:p>
             <a:fld id="{543FFB24-F10E-4FC0-B071-004DD38FB1BB}" type="datetimeFigureOut">
               <a:rPr lang="en-US" smtClean="0"/>
-              <a:t>07-Nov-16</a:t>
+              <a:t>11/8/2016</a:t>
             </a:fld>
             <a:endParaRPr lang="en-US"/>
           </a:p>
@@ -3290,7 +3290,7 @@
           <a:p>
             <a:fld id="{543FFB24-F10E-4FC0-B071-004DD38FB1BB}" type="datetimeFigureOut">
               <a:rPr lang="en-US" smtClean="0"/>
-              <a:t>07-Nov-16</a:t>
+              <a:t>11/8/2016</a:t>
             </a:fld>
             <a:endParaRPr lang="en-US"/>
           </a:p>
@@ -3854,11 +3854,7 @@
           <a:p>
             <a:r>
               <a:rPr lang="en-US" dirty="0" smtClean="0"/>
-              <a:t>ECE407: Neural </a:t>
-            </a:r>
-            <a:r>
-              <a:rPr lang="en-US" dirty="0" smtClean="0"/>
-              <a:t>Networks and Fuzzy Control</a:t>
+              <a:t>ECE407: Neural Networks and Fuzzy Control</a:t>
             </a:r>
             <a:endParaRPr lang="en-US" dirty="0"/>
           </a:p>
@@ -3872,7 +3868,7 @@
         </p:nvSpPr>
         <p:spPr>
           <a:xfrm>
-            <a:off x="485192" y="531844"/>
+            <a:off x="1097280" y="531844"/>
             <a:ext cx="3060197" cy="646331"/>
           </a:xfrm>
           <a:prstGeom prst="rect">
@@ -3892,11 +3888,7 @@
             </a:r>
             <a:r>
               <a:rPr lang="en-US" dirty="0" smtClean="0"/>
-              <a:t>Prof</a:t>
-            </a:r>
-            <a:r>
-              <a:rPr lang="en-US" dirty="0" smtClean="0"/>
-              <a:t>. Sankar Ganesh S</a:t>
+              <a:t>Prof. Sankar Ganesh S</a:t>
             </a:r>
           </a:p>
           <a:p>
@@ -3920,8 +3912,8 @@
         </p:nvSpPr>
         <p:spPr>
           <a:xfrm>
-            <a:off x="8146473" y="393344"/>
-            <a:ext cx="3487346" cy="923330"/>
+            <a:off x="7703389" y="531844"/>
+            <a:ext cx="3452291" cy="923330"/>
           </a:xfrm>
           <a:prstGeom prst="rect">
             <a:avLst/>
@@ -3934,20 +3926,21 @@
           </a:bodyPr>
           <a:lstStyle/>
           <a:p>
+            <a:pPr algn="r"/>
             <a:r>
               <a:rPr lang="en-US" dirty="0" smtClean="0"/>
               <a:t>Aman Sardana (13BEC0107)</a:t>
             </a:r>
-            <a:endParaRPr lang="en-US" dirty="0" smtClean="0"/>
-          </a:p>
-          <a:p>
+          </a:p>
+          <a:p>
+            <a:pPr algn="r"/>
             <a:r>
               <a:rPr lang="en-US" dirty="0" smtClean="0"/>
               <a:t>Rakshith Manandi (13BEC0390)</a:t>
             </a:r>
-            <a:endParaRPr lang="en-US" dirty="0" smtClean="0"/>
-          </a:p>
-          <a:p>
+          </a:p>
+          <a:p>
+            <a:pPr algn="r"/>
             <a:r>
               <a:rPr lang="en-US" dirty="0" smtClean="0"/>
               <a:t>Vinay Gupta (13BEC0749)</a:t>
@@ -4319,11 +4312,7 @@
             </a:r>
             <a:r>
               <a:rPr lang="en-US" dirty="0" smtClean="0"/>
-              <a:t>, </a:t>
-            </a:r>
-            <a:r>
-              <a:rPr lang="en-US" dirty="0" smtClean="0"/>
-              <a:t>using </a:t>
+              <a:t>, using </a:t>
             </a:r>
             <a:r>
               <a:rPr lang="en-US" i="1" dirty="0" smtClean="0"/>
@@ -4333,7 +4322,6 @@
               <a:rPr lang="en-US" dirty="0" smtClean="0"/>
               <a:t>.</a:t>
             </a:r>
-            <a:endParaRPr lang="en-US" dirty="0" smtClean="0"/>
           </a:p>
           <a:p>
             <a:endParaRPr lang="en-US" dirty="0"/>
@@ -4804,6 +4792,10 @@
               <a:rPr lang="en-US" dirty="0" smtClean="0"/>
               <a:t>Our implementation achieved </a:t>
             </a:r>
+            <a:r>
+              <a:rPr lang="en-US" dirty="0" smtClean="0"/>
+              <a:t>(using 20 hidden nodes only):</a:t>
+            </a:r>
             <a:endParaRPr lang="en-US" dirty="0" smtClean="0"/>
           </a:p>
           <a:p>
@@ -4825,17 +4817,22 @@
             <a:endParaRPr lang="en-US" dirty="0"/>
           </a:p>
           <a:p>
+            <a:pPr algn="just"/>
             <a:r>
               <a:rPr lang="en-US" dirty="0" smtClean="0"/>
-              <a:t>We </a:t>
+              <a:t>We also planned to investigate network performance with real pictures of digits, </a:t>
             </a:r>
             <a:r>
               <a:rPr lang="en-US" dirty="0" smtClean="0"/>
-              <a:t>also planned to investigate </a:t>
+              <a:t>with image </a:t>
             </a:r>
             <a:r>
               <a:rPr lang="en-US" dirty="0" smtClean="0"/>
-              <a:t>network performance with real pictures of digits, with pre-processing as required.</a:t>
+              <a:t>pre-processing as required</a:t>
+            </a:r>
+            <a:r>
+              <a:rPr lang="en-US" dirty="0" smtClean="0"/>
+              <a:t>. Further, we also try to improve performance as per general guidelines by adjusting number of hidden nodes.</a:t>
             </a:r>
             <a:endParaRPr lang="en-US" dirty="0"/>
           </a:p>

</xml_diff>